<commit_message>
02 - pptx edit
</commit_message>
<xml_diff>
--- a/vizualization.pptx
+++ b/vizualization.pptx
@@ -12,8 +12,6 @@
     <p:sldId id="263" r:id="rId6"/>
     <p:sldId id="265" r:id="rId7"/>
     <p:sldId id="264" r:id="rId8"/>
-    <p:sldId id="266" r:id="rId9"/>
-    <p:sldId id="267" r:id="rId10"/>
   </p:sldIdLst>
   <p:sldSz cx="9144000" cy="6858000" type="screen4x3"/>
   <p:notesSz cx="6858000" cy="9144000"/>
@@ -310,7 +308,7 @@
           <a:p>
             <a:fld id="{B4C71EC6-210F-42DE-9C53-41977AD35B3D}" type="datetimeFigureOut">
               <a:rPr lang="ru-RU" smtClean="0"/>
-              <a:t>16.09.2022</a:t>
+              <a:t>28.09.2022</a:t>
             </a:fld>
             <a:endParaRPr lang="ru-RU"/>
           </a:p>
@@ -478,7 +476,7 @@
           <a:p>
             <a:fld id="{B4C71EC6-210F-42DE-9C53-41977AD35B3D}" type="datetimeFigureOut">
               <a:rPr lang="ru-RU" smtClean="0"/>
-              <a:t>16.09.2022</a:t>
+              <a:t>28.09.2022</a:t>
             </a:fld>
             <a:endParaRPr lang="ru-RU"/>
           </a:p>
@@ -656,7 +654,7 @@
           <a:p>
             <a:fld id="{B4C71EC6-210F-42DE-9C53-41977AD35B3D}" type="datetimeFigureOut">
               <a:rPr lang="ru-RU" smtClean="0"/>
-              <a:t>16.09.2022</a:t>
+              <a:t>28.09.2022</a:t>
             </a:fld>
             <a:endParaRPr lang="ru-RU"/>
           </a:p>
@@ -824,7 +822,7 @@
           <a:p>
             <a:fld id="{B4C71EC6-210F-42DE-9C53-41977AD35B3D}" type="datetimeFigureOut">
               <a:rPr lang="ru-RU" smtClean="0"/>
-              <a:t>16.09.2022</a:t>
+              <a:t>28.09.2022</a:t>
             </a:fld>
             <a:endParaRPr lang="ru-RU"/>
           </a:p>
@@ -1069,7 +1067,7 @@
           <a:p>
             <a:fld id="{B4C71EC6-210F-42DE-9C53-41977AD35B3D}" type="datetimeFigureOut">
               <a:rPr lang="ru-RU" smtClean="0"/>
-              <a:t>16.09.2022</a:t>
+              <a:t>28.09.2022</a:t>
             </a:fld>
             <a:endParaRPr lang="ru-RU"/>
           </a:p>
@@ -1354,7 +1352,7 @@
           <a:p>
             <a:fld id="{B4C71EC6-210F-42DE-9C53-41977AD35B3D}" type="datetimeFigureOut">
               <a:rPr lang="ru-RU" smtClean="0"/>
-              <a:t>16.09.2022</a:t>
+              <a:t>28.09.2022</a:t>
             </a:fld>
             <a:endParaRPr lang="ru-RU"/>
           </a:p>
@@ -1773,7 +1771,7 @@
           <a:p>
             <a:fld id="{B4C71EC6-210F-42DE-9C53-41977AD35B3D}" type="datetimeFigureOut">
               <a:rPr lang="ru-RU" smtClean="0"/>
-              <a:t>16.09.2022</a:t>
+              <a:t>28.09.2022</a:t>
             </a:fld>
             <a:endParaRPr lang="ru-RU"/>
           </a:p>
@@ -1890,7 +1888,7 @@
           <a:p>
             <a:fld id="{B4C71EC6-210F-42DE-9C53-41977AD35B3D}" type="datetimeFigureOut">
               <a:rPr lang="ru-RU" smtClean="0"/>
-              <a:t>16.09.2022</a:t>
+              <a:t>28.09.2022</a:t>
             </a:fld>
             <a:endParaRPr lang="ru-RU"/>
           </a:p>
@@ -1985,7 +1983,7 @@
           <a:p>
             <a:fld id="{B4C71EC6-210F-42DE-9C53-41977AD35B3D}" type="datetimeFigureOut">
               <a:rPr lang="ru-RU" smtClean="0"/>
-              <a:t>16.09.2022</a:t>
+              <a:t>28.09.2022</a:t>
             </a:fld>
             <a:endParaRPr lang="ru-RU"/>
           </a:p>
@@ -2260,7 +2258,7 @@
           <a:p>
             <a:fld id="{B4C71EC6-210F-42DE-9C53-41977AD35B3D}" type="datetimeFigureOut">
               <a:rPr lang="ru-RU" smtClean="0"/>
-              <a:t>16.09.2022</a:t>
+              <a:t>28.09.2022</a:t>
             </a:fld>
             <a:endParaRPr lang="ru-RU"/>
           </a:p>
@@ -2512,7 +2510,7 @@
           <a:p>
             <a:fld id="{B4C71EC6-210F-42DE-9C53-41977AD35B3D}" type="datetimeFigureOut">
               <a:rPr lang="ru-RU" smtClean="0"/>
-              <a:t>16.09.2022</a:t>
+              <a:t>28.09.2022</a:t>
             </a:fld>
             <a:endParaRPr lang="ru-RU"/>
           </a:p>
@@ -2728,7 +2726,7 @@
           <a:p>
             <a:fld id="{B4C71EC6-210F-42DE-9C53-41977AD35B3D}" type="datetimeFigureOut">
               <a:rPr lang="ru-RU" smtClean="0"/>
-              <a:t>16.09.2022</a:t>
+              <a:t>28.09.2022</a:t>
             </a:fld>
             <a:endParaRPr lang="ru-RU"/>
           </a:p>
@@ -3242,10 +3240,10 @@
           <a:lstStyle/>
           <a:p>
             <a:r>
-              <a:rPr lang="en-US"/>
+              <a:rPr lang="en-US" dirty="0"/>
               <a:t>Hypothesis</a:t>
             </a:r>
-            <a:endParaRPr lang="ru-RU"/>
+            <a:endParaRPr lang="ru-RU" dirty="0"/>
           </a:p>
         </p:txBody>
       </p:sp>
@@ -3259,21 +3257,55 @@
             <p:ph idx="1"/>
           </p:nvPr>
         </p:nvSpPr>
-        <p:spPr/>
-        <p:txBody>
-          <a:bodyPr/>
+        <p:spPr>
+          <a:xfrm>
+            <a:off x="457200" y="1600200"/>
+            <a:ext cx="8291264" cy="4983162"/>
+          </a:xfrm>
+        </p:spPr>
+        <p:txBody>
+          <a:bodyPr>
+            <a:normAutofit/>
+          </a:bodyPr>
           <a:lstStyle/>
           <a:p>
             <a:r>
               <a:rPr lang="en-US" dirty="0"/>
-              <a:t>It is supposed that Kazakhstani government wasn’t ready for results of baby-boom happened in 2000-2005</a:t>
+              <a:t>The more demand, the higher the price, so why is there a high demand in Almaty</a:t>
             </a:r>
           </a:p>
           <a:p>
             <a:r>
               <a:rPr lang="en-US" dirty="0"/>
-              <a:t>Fact of insufficient number of rooms in university-connected hostels, leads to rent costs increase</a:t>
-            </a:r>
+              <a:t>In Almaty 42 universities, and about 70% students came from other cities. </a:t>
+            </a:r>
+            <a:r>
+              <a:rPr lang="en-US" b="0" i="0" dirty="0">
+                <a:solidFill>
+                  <a:srgbClr val="000000"/>
+                </a:solidFill>
+                <a:effectLst/>
+              </a:rPr>
+              <a:t>Only 25% of students who needed a hostel got a place.</a:t>
+            </a:r>
+            <a:endParaRPr lang="ru-RU" b="0" i="0" dirty="0">
+              <a:solidFill>
+                <a:srgbClr val="000000"/>
+              </a:solidFill>
+              <a:effectLst/>
+            </a:endParaRPr>
+          </a:p>
+          <a:p>
+            <a:r>
+              <a:rPr lang="en-US" b="0" i="0" dirty="0">
+                <a:solidFill>
+                  <a:srgbClr val="000000"/>
+                </a:solidFill>
+                <a:effectLst/>
+              </a:rPr>
+              <a:t>The number of migrants from Russia to Kazakhstan has increased</a:t>
+            </a:r>
+            <a:endParaRPr lang="en-US" dirty="0"/>
           </a:p>
           <a:p>
             <a:r>
@@ -3349,12 +3381,29 @@
         </p:nvSpPr>
         <p:spPr/>
         <p:txBody>
-          <a:bodyPr/>
-          <a:lstStyle/>
-          <a:p>
-            <a:r>
-              <a:rPr lang="en-US" dirty="0"/>
-              <a:t>Quality of life</a:t>
+          <a:bodyPr>
+            <a:normAutofit/>
+          </a:bodyPr>
+          <a:lstStyle/>
+          <a:p>
+            <a:r>
+              <a:rPr lang="en-US" b="0" i="0" dirty="0">
+                <a:solidFill>
+                  <a:srgbClr val="000000"/>
+                </a:solidFill>
+                <a:effectLst/>
+              </a:rPr>
+              <a:t>Everyone needs an apartment</a:t>
+            </a:r>
+            <a:r>
+              <a:rPr lang="ru-RU" b="0" i="0" dirty="0">
+                <a:solidFill>
+                  <a:srgbClr val="000000"/>
+                </a:solidFill>
+                <a:effectLst/>
+                <a:latin typeface="Roboto" panose="02000000000000000000" pitchFamily="2" charset="0"/>
+              </a:rPr>
+              <a:t>	</a:t>
             </a:r>
           </a:p>
           <a:p>
@@ -3371,271 +3420,35 @@
           </a:p>
           <a:p>
             <a:r>
-              <a:rPr lang="en-US" dirty="0"/>
-              <a:t>Educational process</a:t>
-            </a:r>
-          </a:p>
-          <a:p>
+              <a:rPr lang="en-US" b="0" i="0" dirty="0">
+                <a:solidFill>
+                  <a:srgbClr val="000000"/>
+                </a:solidFill>
+                <a:effectLst/>
+              </a:rPr>
+              <a:t>apartment for access to education for students</a:t>
+            </a:r>
+            <a:endParaRPr lang="ru-RU" b="0" i="0" dirty="0">
+              <a:solidFill>
+                <a:srgbClr val="000000"/>
+              </a:solidFill>
+              <a:effectLst/>
+            </a:endParaRPr>
+          </a:p>
+          <a:p>
+            <a:r>
+              <a:rPr lang="en-US" b="0" i="0" dirty="0">
+                <a:solidFill>
+                  <a:srgbClr val="000000"/>
+                </a:solidFill>
+                <a:effectLst/>
+              </a:rPr>
+              <a:t>In connection with recent events, many Russians come to Kazakhstan, does this factor affect changes in the price of rent in Almaty</a:t>
+            </a:r>
             <a:endParaRPr lang="ru-RU" dirty="0"/>
           </a:p>
         </p:txBody>
       </p:sp>
-      <p:pic>
-        <p:nvPicPr>
-          <p:cNvPr id="1026" name="Picture 2"/>
-          <p:cNvPicPr>
-            <a:picLocks noChangeAspect="1" noChangeArrowheads="1"/>
-          </p:cNvPicPr>
-          <p:nvPr/>
-        </p:nvPicPr>
-        <p:blipFill>
-          <a:blip r:embed="rId2">
-            <a:extLst>
-              <a:ext uri="{28A0092B-C50C-407E-A947-70E740481C1C}">
-                <a14:useLocalDpi xmlns:a14="http://schemas.microsoft.com/office/drawing/2010/main" val="0"/>
-              </a:ext>
-            </a:extLst>
-          </a:blip>
-          <a:srcRect/>
-          <a:stretch>
-            <a:fillRect/>
-          </a:stretch>
-        </p:blipFill>
-        <p:spPr bwMode="auto">
-          <a:xfrm>
-            <a:off x="611560" y="6126163"/>
-            <a:ext cx="5508104" cy="492108"/>
-          </a:xfrm>
-          <a:prstGeom prst="rect">
-            <a:avLst/>
-          </a:prstGeom>
-          <a:noFill/>
-          <a:ln>
-            <a:noFill/>
-          </a:ln>
-          <a:effectLst/>
-          <a:extLst>
-            <a:ext uri="{909E8E84-426E-40DD-AFC4-6F175D3DCCD1}">
-              <a14:hiddenFill xmlns:a14="http://schemas.microsoft.com/office/drawing/2010/main">
-                <a:solidFill>
-                  <a:schemeClr val="accent1"/>
-                </a:solidFill>
-              </a14:hiddenFill>
-            </a:ext>
-            <a:ext uri="{91240B29-F687-4F45-9708-019B960494DF}">
-              <a14:hiddenLine xmlns:a14="http://schemas.microsoft.com/office/drawing/2010/main" w="9525">
-                <a:solidFill>
-                  <a:schemeClr val="tx1"/>
-                </a:solidFill>
-                <a:miter lim="800000"/>
-                <a:headEnd/>
-                <a:tailEnd/>
-              </a14:hiddenLine>
-            </a:ext>
-            <a:ext uri="{AF507438-7753-43E0-B8FC-AC1667EBCBE1}">
-              <a14:hiddenEffects xmlns:a14="http://schemas.microsoft.com/office/drawing/2010/main">
-                <a:effectLst>
-                  <a:outerShdw dist="35921" dir="2700000" algn="ctr" rotWithShape="0">
-                    <a:schemeClr val="bg2"/>
-                  </a:outerShdw>
-                </a:effectLst>
-              </a14:hiddenEffects>
-            </a:ext>
-          </a:extLst>
-        </p:spPr>
-      </p:pic>
-      <p:pic>
-        <p:nvPicPr>
-          <p:cNvPr id="1028" name="Picture 4"/>
-          <p:cNvPicPr>
-            <a:picLocks noChangeAspect="1" noChangeArrowheads="1"/>
-          </p:cNvPicPr>
-          <p:nvPr/>
-        </p:nvPicPr>
-        <p:blipFill>
-          <a:blip r:embed="rId3">
-            <a:extLst>
-              <a:ext uri="{28A0092B-C50C-407E-A947-70E740481C1C}">
-                <a14:useLocalDpi xmlns:a14="http://schemas.microsoft.com/office/drawing/2010/main" val="0"/>
-              </a:ext>
-            </a:extLst>
-          </a:blip>
-          <a:srcRect/>
-          <a:stretch>
-            <a:fillRect/>
-          </a:stretch>
-        </p:blipFill>
-        <p:spPr bwMode="auto">
-          <a:xfrm>
-            <a:off x="611560" y="4918184"/>
-            <a:ext cx="5772249" cy="414103"/>
-          </a:xfrm>
-          <a:prstGeom prst="rect">
-            <a:avLst/>
-          </a:prstGeom>
-          <a:noFill/>
-          <a:ln>
-            <a:noFill/>
-          </a:ln>
-          <a:effectLst/>
-          <a:extLst>
-            <a:ext uri="{909E8E84-426E-40DD-AFC4-6F175D3DCCD1}">
-              <a14:hiddenFill xmlns:a14="http://schemas.microsoft.com/office/drawing/2010/main">
-                <a:solidFill>
-                  <a:schemeClr val="accent1"/>
-                </a:solidFill>
-              </a14:hiddenFill>
-            </a:ext>
-            <a:ext uri="{91240B29-F687-4F45-9708-019B960494DF}">
-              <a14:hiddenLine xmlns:a14="http://schemas.microsoft.com/office/drawing/2010/main" w="9525">
-                <a:solidFill>
-                  <a:schemeClr val="tx1"/>
-                </a:solidFill>
-                <a:miter lim="800000"/>
-                <a:headEnd/>
-                <a:tailEnd/>
-              </a14:hiddenLine>
-            </a:ext>
-            <a:ext uri="{AF507438-7753-43E0-B8FC-AC1667EBCBE1}">
-              <a14:hiddenEffects xmlns:a14="http://schemas.microsoft.com/office/drawing/2010/main">
-                <a:effectLst>
-                  <a:outerShdw dist="35921" dir="2700000" algn="ctr" rotWithShape="0">
-                    <a:schemeClr val="bg2"/>
-                  </a:outerShdw>
-                </a:effectLst>
-              </a14:hiddenEffects>
-            </a:ext>
-          </a:extLst>
-        </p:spPr>
-      </p:pic>
-      <p:pic>
-        <p:nvPicPr>
-          <p:cNvPr id="1029" name="Picture 5"/>
-          <p:cNvPicPr>
-            <a:picLocks noChangeAspect="1" noChangeArrowheads="1"/>
-          </p:cNvPicPr>
-          <p:nvPr/>
-        </p:nvPicPr>
-        <p:blipFill>
-          <a:blip r:embed="rId4">
-            <a:extLst>
-              <a:ext uri="{28A0092B-C50C-407E-A947-70E740481C1C}">
-                <a14:useLocalDpi xmlns:a14="http://schemas.microsoft.com/office/drawing/2010/main" val="0"/>
-              </a:ext>
-            </a:extLst>
-          </a:blip>
-          <a:srcRect/>
-          <a:stretch>
-            <a:fillRect/>
-          </a:stretch>
-        </p:blipFill>
-        <p:spPr bwMode="auto">
-          <a:xfrm>
-            <a:off x="3448312" y="4122094"/>
-            <a:ext cx="4741076" cy="637099"/>
-          </a:xfrm>
-          <a:prstGeom prst="rect">
-            <a:avLst/>
-          </a:prstGeom>
-          <a:noFill/>
-          <a:ln>
-            <a:noFill/>
-          </a:ln>
-          <a:effectLst/>
-          <a:extLst>
-            <a:ext uri="{909E8E84-426E-40DD-AFC4-6F175D3DCCD1}">
-              <a14:hiddenFill xmlns:a14="http://schemas.microsoft.com/office/drawing/2010/main">
-                <a:solidFill>
-                  <a:schemeClr val="accent1"/>
-                </a:solidFill>
-              </a14:hiddenFill>
-            </a:ext>
-            <a:ext uri="{91240B29-F687-4F45-9708-019B960494DF}">
-              <a14:hiddenLine xmlns:a14="http://schemas.microsoft.com/office/drawing/2010/main" w="9525">
-                <a:solidFill>
-                  <a:schemeClr val="tx1"/>
-                </a:solidFill>
-                <a:miter lim="800000"/>
-                <a:headEnd/>
-                <a:tailEnd/>
-              </a14:hiddenLine>
-            </a:ext>
-            <a:ext uri="{AF507438-7753-43E0-B8FC-AC1667EBCBE1}">
-              <a14:hiddenEffects xmlns:a14="http://schemas.microsoft.com/office/drawing/2010/main">
-                <a:effectLst>
-                  <a:outerShdw dist="35921" dir="2700000" algn="ctr" rotWithShape="0">
-                    <a:schemeClr val="bg2"/>
-                  </a:outerShdw>
-                </a:effectLst>
-              </a14:hiddenEffects>
-            </a:ext>
-          </a:extLst>
-        </p:spPr>
-      </p:pic>
-      <p:pic>
-        <p:nvPicPr>
-          <p:cNvPr id="1030" name="Picture 6"/>
-          <p:cNvPicPr>
-            <a:picLocks noChangeAspect="1" noChangeArrowheads="1"/>
-          </p:cNvPicPr>
-          <p:nvPr/>
-        </p:nvPicPr>
-        <p:blipFill>
-          <a:blip r:embed="rId5">
-            <a:extLst>
-              <a:ext uri="{28A0092B-C50C-407E-A947-70E740481C1C}">
-                <a14:useLocalDpi xmlns:a14="http://schemas.microsoft.com/office/drawing/2010/main" val="0"/>
-              </a:ext>
-            </a:extLst>
-          </a:blip>
-          <a:srcRect/>
-          <a:stretch>
-            <a:fillRect/>
-          </a:stretch>
-        </p:blipFill>
-        <p:spPr bwMode="auto">
-          <a:xfrm>
-            <a:off x="3275856" y="5472201"/>
-            <a:ext cx="5299517" cy="537618"/>
-          </a:xfrm>
-          <a:prstGeom prst="rect">
-            <a:avLst/>
-          </a:prstGeom>
-          <a:noFill/>
-          <a:ln>
-            <a:noFill/>
-          </a:ln>
-          <a:effectLst/>
-          <a:extLst>
-            <a:ext uri="{909E8E84-426E-40DD-AFC4-6F175D3DCCD1}">
-              <a14:hiddenFill xmlns:a14="http://schemas.microsoft.com/office/drawing/2010/main">
-                <a:solidFill>
-                  <a:schemeClr val="accent1"/>
-                </a:solidFill>
-              </a14:hiddenFill>
-            </a:ext>
-            <a:ext uri="{91240B29-F687-4F45-9708-019B960494DF}">
-              <a14:hiddenLine xmlns:a14="http://schemas.microsoft.com/office/drawing/2010/main" w="9525">
-                <a:solidFill>
-                  <a:schemeClr val="tx1"/>
-                </a:solidFill>
-                <a:miter lim="800000"/>
-                <a:headEnd/>
-                <a:tailEnd/>
-              </a14:hiddenLine>
-            </a:ext>
-            <a:ext uri="{AF507438-7753-43E0-B8FC-AC1667EBCBE1}">
-              <a14:hiddenEffects xmlns:a14="http://schemas.microsoft.com/office/drawing/2010/main">
-                <a:effectLst>
-                  <a:outerShdw dist="35921" dir="2700000" algn="ctr" rotWithShape="0">
-                    <a:schemeClr val="bg2"/>
-                  </a:outerShdw>
-                </a:effectLst>
-              </a14:hiddenEffects>
-            </a:ext>
-          </a:extLst>
-        </p:spPr>
-      </p:pic>
     </p:spTree>
     <p:extLst>
       <p:ext uri="{BB962C8B-B14F-4D97-AF65-F5344CB8AC3E}">
@@ -3897,25 +3710,6 @@
                 </a:solidFill>
               </a14:hiddenFill>
             </a:ext>
-            <a:ext uri="{91240B29-F687-4F45-9708-019B960494DF}">
-              <a14:hiddenLine xmlns:a14="http://schemas.microsoft.com/office/drawing/2010/main" w="9525">
-                <a:solidFill>
-                  <a:schemeClr val="tx1"/>
-                </a:solidFill>
-                <a:miter lim="800000"/>
-                <a:headEnd/>
-                <a:tailEnd/>
-              </a14:hiddenLine>
-            </a:ext>
-            <a:ext uri="{AF507438-7753-43E0-B8FC-AC1667EBCBE1}">
-              <a14:hiddenEffects xmlns:a14="http://schemas.microsoft.com/office/drawing/2010/main">
-                <a:effectLst>
-                  <a:outerShdw dist="35921" dir="2700000" algn="ctr" rotWithShape="0">
-                    <a:schemeClr val="bg2"/>
-                  </a:outerShdw>
-                </a:effectLst>
-              </a14:hiddenEffects>
-            </a:ext>
           </a:extLst>
         </p:spPr>
       </p:pic>
@@ -4008,25 +3802,6 @@
                   <a:schemeClr val="accent1"/>
                 </a:solidFill>
               </a14:hiddenFill>
-            </a:ext>
-            <a:ext uri="{91240B29-F687-4F45-9708-019B960494DF}">
-              <a14:hiddenLine xmlns:a14="http://schemas.microsoft.com/office/drawing/2010/main" w="9525">
-                <a:solidFill>
-                  <a:schemeClr val="tx1"/>
-                </a:solidFill>
-                <a:miter lim="800000"/>
-                <a:headEnd/>
-                <a:tailEnd/>
-              </a14:hiddenLine>
-            </a:ext>
-            <a:ext uri="{AF507438-7753-43E0-B8FC-AC1667EBCBE1}">
-              <a14:hiddenEffects xmlns:a14="http://schemas.microsoft.com/office/drawing/2010/main">
-                <a:effectLst>
-                  <a:outerShdw dist="35921" dir="2700000" algn="ctr" rotWithShape="0">
-                    <a:schemeClr val="bg2"/>
-                  </a:outerShdw>
-                </a:effectLst>
-              </a14:hiddenEffects>
             </a:ext>
           </a:extLst>
         </p:spPr>
@@ -4575,227 +4350,6 @@
     <p:extLst>
       <p:ext uri="{BB962C8B-B14F-4D97-AF65-F5344CB8AC3E}">
         <p14:creationId xmlns:p14="http://schemas.microsoft.com/office/powerpoint/2010/main" val="3601120423"/>
-      </p:ext>
-    </p:extLst>
-  </p:cSld>
-  <p:clrMapOvr>
-    <a:masterClrMapping/>
-  </p:clrMapOvr>
-</p:sld>
-</file>
-
-<file path=ppt/slides/slide8.xml><?xml version="1.0" encoding="utf-8"?>
-<p:sld xmlns:a="http://schemas.openxmlformats.org/drawingml/2006/main" xmlns:r="http://schemas.openxmlformats.org/officeDocument/2006/relationships" xmlns:p="http://schemas.openxmlformats.org/presentationml/2006/main">
-  <p:cSld>
-    <p:spTree>
-      <p:nvGrpSpPr>
-        <p:cNvPr id="1" name=""/>
-        <p:cNvGrpSpPr/>
-        <p:nvPr/>
-      </p:nvGrpSpPr>
-      <p:grpSpPr>
-        <a:xfrm>
-          <a:off x="0" y="0"/>
-          <a:ext cx="0" cy="0"/>
-          <a:chOff x="0" y="0"/>
-          <a:chExt cx="0" cy="0"/>
-        </a:xfrm>
-      </p:grpSpPr>
-      <p:pic>
-        <p:nvPicPr>
-          <p:cNvPr id="5" name="Рисунок 4">
-            <a:extLst>
-              <a:ext uri="{FF2B5EF4-FFF2-40B4-BE49-F238E27FC236}">
-                <a16:creationId xmlns:a16="http://schemas.microsoft.com/office/drawing/2014/main" id="{9836C881-B64B-4555-9309-9CD3C0FBF171}"/>
-              </a:ext>
-            </a:extLst>
-          </p:cNvPr>
-          <p:cNvPicPr>
-            <a:picLocks noChangeAspect="1"/>
-          </p:cNvPicPr>
-          <p:nvPr/>
-        </p:nvPicPr>
-        <p:blipFill>
-          <a:blip r:embed="rId2"/>
-          <a:stretch>
-            <a:fillRect/>
-          </a:stretch>
-        </p:blipFill>
-        <p:spPr>
-          <a:xfrm>
-            <a:off x="0" y="1017144"/>
-            <a:ext cx="9144000" cy="4823712"/>
-          </a:xfrm>
-          <a:prstGeom prst="rect">
-            <a:avLst/>
-          </a:prstGeom>
-        </p:spPr>
-      </p:pic>
-      <p:sp>
-        <p:nvSpPr>
-          <p:cNvPr id="6" name="Заголовок 1">
-            <a:extLst>
-              <a:ext uri="{FF2B5EF4-FFF2-40B4-BE49-F238E27FC236}">
-                <a16:creationId xmlns:a16="http://schemas.microsoft.com/office/drawing/2014/main" id="{7812ADD2-6B33-4843-AED5-D5A350654B19}"/>
-              </a:ext>
-            </a:extLst>
-          </p:cNvPr>
-          <p:cNvSpPr>
-            <a:spLocks noGrp="1"/>
-          </p:cNvSpPr>
-          <p:nvPr>
-            <p:ph type="title"/>
-          </p:nvPr>
-        </p:nvSpPr>
-        <p:spPr>
-          <a:xfrm>
-            <a:off x="1794520" y="332656"/>
-            <a:ext cx="5554960" cy="476672"/>
-          </a:xfrm>
-        </p:spPr>
-        <p:txBody>
-          <a:bodyPr>
-            <a:normAutofit fontScale="90000"/>
-          </a:bodyPr>
-          <a:lstStyle/>
-          <a:p>
-            <a:r>
-              <a:rPr lang="en-US" dirty="0"/>
-              <a:t>2021</a:t>
-            </a:r>
-            <a:endParaRPr lang="ru-RU" dirty="0"/>
-          </a:p>
-        </p:txBody>
-      </p:sp>
-    </p:spTree>
-    <p:extLst>
-      <p:ext uri="{BB962C8B-B14F-4D97-AF65-F5344CB8AC3E}">
-        <p14:creationId xmlns:p14="http://schemas.microsoft.com/office/powerpoint/2010/main" val="789473602"/>
-      </p:ext>
-    </p:extLst>
-  </p:cSld>
-  <p:clrMapOvr>
-    <a:masterClrMapping/>
-  </p:clrMapOvr>
-</p:sld>
-</file>
-
-<file path=ppt/slides/slide9.xml><?xml version="1.0" encoding="utf-8"?>
-<p:sld xmlns:a="http://schemas.openxmlformats.org/drawingml/2006/main" xmlns:r="http://schemas.openxmlformats.org/officeDocument/2006/relationships" xmlns:p="http://schemas.openxmlformats.org/presentationml/2006/main">
-  <p:cSld>
-    <p:spTree>
-      <p:nvGrpSpPr>
-        <p:cNvPr id="1" name=""/>
-        <p:cNvGrpSpPr/>
-        <p:nvPr/>
-      </p:nvGrpSpPr>
-      <p:grpSpPr>
-        <a:xfrm>
-          <a:off x="0" y="0"/>
-          <a:ext cx="0" cy="0"/>
-          <a:chOff x="0" y="0"/>
-          <a:chExt cx="0" cy="0"/>
-        </a:xfrm>
-      </p:grpSpPr>
-      <p:sp>
-        <p:nvSpPr>
-          <p:cNvPr id="3" name="Объект 2">
-            <a:extLst>
-              <a:ext uri="{FF2B5EF4-FFF2-40B4-BE49-F238E27FC236}">
-                <a16:creationId xmlns:a16="http://schemas.microsoft.com/office/drawing/2014/main" id="{E5A0284E-C54D-4FFC-8C40-E60B2E953CD6}"/>
-              </a:ext>
-            </a:extLst>
-          </p:cNvPr>
-          <p:cNvSpPr>
-            <a:spLocks noGrp="1"/>
-          </p:cNvSpPr>
-          <p:nvPr>
-            <p:ph idx="1"/>
-          </p:nvPr>
-        </p:nvSpPr>
-        <p:spPr/>
-        <p:txBody>
-          <a:bodyPr/>
-          <a:lstStyle/>
-          <a:p>
-            <a:r>
-              <a:rPr lang="en-US" dirty="0"/>
-              <a:t>Data link: </a:t>
-            </a:r>
-            <a:r>
-              <a:rPr lang="en-US" dirty="0">
-                <a:hlinkClick r:id="rId2"/>
-              </a:rPr>
-              <a:t>https://stat.gov.kz/official/industry/62/statistic/5</a:t>
-            </a:r>
-            <a:endParaRPr lang="en-US" dirty="0"/>
-          </a:p>
-          <a:p>
-            <a:r>
-              <a:rPr lang="en-US" dirty="0"/>
-              <a:t>…</a:t>
-            </a:r>
-          </a:p>
-          <a:p>
-            <a:endParaRPr lang="en-US" dirty="0"/>
-          </a:p>
-          <a:p>
-            <a:r>
-              <a:rPr lang="en-US" b="0" i="0" dirty="0">
-                <a:solidFill>
-                  <a:srgbClr val="000000"/>
-                </a:solidFill>
-                <a:effectLst/>
-                <a:latin typeface="Roboto" panose="02000000000000000000" pitchFamily="2" charset="0"/>
-              </a:rPr>
-              <a:t>data available from 1999 to 2021</a:t>
-            </a:r>
-            <a:r>
-              <a:rPr lang="ru-RU" dirty="0">
-                <a:solidFill>
-                  <a:srgbClr val="000000"/>
-                </a:solidFill>
-                <a:latin typeface="Roboto" panose="02000000000000000000" pitchFamily="2" charset="0"/>
-              </a:rPr>
-              <a:t>, </a:t>
-            </a:r>
-            <a:r>
-              <a:rPr lang="en-US" dirty="0">
-                <a:solidFill>
-                  <a:srgbClr val="000000"/>
-                </a:solidFill>
-                <a:latin typeface="Roboto" panose="02000000000000000000" pitchFamily="2" charset="0"/>
-              </a:rPr>
-              <a:t>in presentation </a:t>
-            </a:r>
-            <a:r>
-              <a:rPr lang="en-US" b="0" i="0" dirty="0">
-                <a:solidFill>
-                  <a:srgbClr val="000000"/>
-                </a:solidFill>
-                <a:effectLst/>
-                <a:latin typeface="Roboto" panose="02000000000000000000" pitchFamily="2" charset="0"/>
-              </a:rPr>
-              <a:t>a small part of all data</a:t>
-            </a:r>
-            <a:r>
-              <a:rPr lang="ru-RU" b="0" i="0" dirty="0">
-                <a:solidFill>
-                  <a:srgbClr val="000000"/>
-                </a:solidFill>
-                <a:effectLst/>
-                <a:latin typeface="Roboto" panose="02000000000000000000" pitchFamily="2" charset="0"/>
-              </a:rPr>
-              <a:t> </a:t>
-            </a:r>
-            <a:endParaRPr lang="en-US" dirty="0"/>
-          </a:p>
-        </p:txBody>
-      </p:sp>
-    </p:spTree>
-    <p:extLst>
-      <p:ext uri="{BB962C8B-B14F-4D97-AF65-F5344CB8AC3E}">
-        <p14:creationId xmlns:p14="http://schemas.microsoft.com/office/powerpoint/2010/main" val="3625417369"/>
       </p:ext>
     </p:extLst>
   </p:cSld>

</xml_diff>